<commit_message>
Add right interfaces to presentation
</commit_message>
<xml_diff>
--- a/docs/Template Schritt 1.pptx
+++ b/docs/Template Schritt 1.pptx
@@ -204,7 +204,7 @@
           <a:p>
             <a:fld id="{2929572C-FEDD-4E4A-B3F1-6DF356625056}" type="datetimeFigureOut">
               <a:rPr lang="de-DE" smtClean="0"/>
-              <a:t>07.01.22</a:t>
+              <a:t>21.01.2022</a:t>
             </a:fld>
             <a:endParaRPr lang="de-DE"/>
           </a:p>
@@ -362,7 +362,7 @@
           <a:p>
             <a:fld id="{CE41919A-CD55-0F49-ABA0-39107DD0472F}" type="slidenum">
               <a:rPr lang="de-DE" smtClean="0"/>
-              <a:t>‹#›</a:t>
+              <a:t>‹Nr.›</a:t>
             </a:fld>
             <a:endParaRPr lang="de-DE"/>
           </a:p>
@@ -696,7 +696,7 @@
           <a:p>
             <a:fld id="{FAD37C5D-DF8F-AF4F-81B9-6EED9415847F}" type="datetime1">
               <a:rPr lang="de-DE" smtClean="0"/>
-              <a:t>07.01.22</a:t>
+              <a:t>21.01.2022</a:t>
             </a:fld>
             <a:endParaRPr lang="de-DE"/>
           </a:p>
@@ -738,7 +738,7 @@
           <a:p>
             <a:fld id="{CFDF7393-88FB-5F49-BE96-ACDA21ADA254}" type="slidenum">
               <a:rPr lang="de-DE" smtClean="0"/>
-              <a:t>‹#›</a:t>
+              <a:t>‹Nr.›</a:t>
             </a:fld>
             <a:endParaRPr lang="de-DE"/>
           </a:p>
@@ -896,7 +896,7 @@
           <a:p>
             <a:fld id="{A3E6961D-9BC7-2C43-BA22-3ABC246EB135}" type="datetime1">
               <a:rPr lang="de-DE" smtClean="0"/>
-              <a:t>07.01.22</a:t>
+              <a:t>21.01.2022</a:t>
             </a:fld>
             <a:endParaRPr lang="de-DE"/>
           </a:p>
@@ -938,7 +938,7 @@
           <a:p>
             <a:fld id="{CFDF7393-88FB-5F49-BE96-ACDA21ADA254}" type="slidenum">
               <a:rPr lang="de-DE" smtClean="0"/>
-              <a:t>‹#›</a:t>
+              <a:t>‹Nr.›</a:t>
             </a:fld>
             <a:endParaRPr lang="de-DE"/>
           </a:p>
@@ -1076,7 +1076,7 @@
           <a:p>
             <a:fld id="{35137B73-EBA6-E745-8A5E-7B237305C98C}" type="datetime1">
               <a:rPr lang="de-DE" smtClean="0"/>
-              <a:t>07.01.22</a:t>
+              <a:t>21.01.2022</a:t>
             </a:fld>
             <a:endParaRPr lang="de-DE"/>
           </a:p>
@@ -1118,7 +1118,7 @@
           <a:p>
             <a:fld id="{CFDF7393-88FB-5F49-BE96-ACDA21ADA254}" type="slidenum">
               <a:rPr lang="de-DE" smtClean="0"/>
-              <a:t>‹#›</a:t>
+              <a:t>‹Nr.›</a:t>
             </a:fld>
             <a:endParaRPr lang="de-DE"/>
           </a:p>
@@ -1345,7 +1345,7 @@
             <a:fld id="{CFDF7393-88FB-5F49-BE96-ACDA21ADA254}" type="slidenum">
               <a:rPr lang="de-DE" smtClean="0"/>
               <a:pPr/>
-              <a:t>‹#›</a:t>
+              <a:t>‹Nr.›</a:t>
             </a:fld>
             <a:endParaRPr lang="de-DE"/>
           </a:p>
@@ -1649,7 +1649,7 @@
           <a:p>
             <a:fld id="{40880E63-77B1-1240-8929-A527E6B911DF}" type="datetime1">
               <a:rPr lang="de-DE" smtClean="0"/>
-              <a:t>07.01.22</a:t>
+              <a:t>21.01.2022</a:t>
             </a:fld>
             <a:endParaRPr lang="de-DE"/>
           </a:p>
@@ -1691,7 +1691,7 @@
           <a:p>
             <a:fld id="{CFDF7393-88FB-5F49-BE96-ACDA21ADA254}" type="slidenum">
               <a:rPr lang="de-DE" smtClean="0"/>
-              <a:t>‹#›</a:t>
+              <a:t>‹Nr.›</a:t>
             </a:fld>
             <a:endParaRPr lang="de-DE"/>
           </a:p>
@@ -1881,7 +1881,7 @@
           <a:p>
             <a:fld id="{2D811020-579B-4B43-95DE-561575636941}" type="datetime1">
               <a:rPr lang="de-DE" smtClean="0"/>
-              <a:t>07.01.22</a:t>
+              <a:t>21.01.2022</a:t>
             </a:fld>
             <a:endParaRPr lang="de-DE"/>
           </a:p>
@@ -1923,7 +1923,7 @@
           <a:p>
             <a:fld id="{CFDF7393-88FB-5F49-BE96-ACDA21ADA254}" type="slidenum">
               <a:rPr lang="de-DE" smtClean="0"/>
-              <a:t>‹#›</a:t>
+              <a:t>‹Nr.›</a:t>
             </a:fld>
             <a:endParaRPr lang="de-DE"/>
           </a:p>
@@ -2248,7 +2248,7 @@
           <a:p>
             <a:fld id="{8676C219-03C8-ED4E-A8C4-96DD067F71E5}" type="datetime1">
               <a:rPr lang="de-DE" smtClean="0"/>
-              <a:t>07.01.22</a:t>
+              <a:t>21.01.2022</a:t>
             </a:fld>
             <a:endParaRPr lang="de-DE"/>
           </a:p>
@@ -2290,7 +2290,7 @@
           <a:p>
             <a:fld id="{CFDF7393-88FB-5F49-BE96-ACDA21ADA254}" type="slidenum">
               <a:rPr lang="de-DE" smtClean="0"/>
-              <a:t>‹#›</a:t>
+              <a:t>‹Nr.›</a:t>
             </a:fld>
             <a:endParaRPr lang="de-DE"/>
           </a:p>
@@ -2366,7 +2366,7 @@
           <a:p>
             <a:fld id="{86B2E7ED-DBF6-EB4D-B662-0C72CBE728BF}" type="datetime1">
               <a:rPr lang="de-DE" smtClean="0"/>
-              <a:t>07.01.22</a:t>
+              <a:t>21.01.2022</a:t>
             </a:fld>
             <a:endParaRPr lang="de-DE"/>
           </a:p>
@@ -2408,7 +2408,7 @@
           <a:p>
             <a:fld id="{CFDF7393-88FB-5F49-BE96-ACDA21ADA254}" type="slidenum">
               <a:rPr lang="de-DE" smtClean="0"/>
-              <a:t>‹#›</a:t>
+              <a:t>‹Nr.›</a:t>
             </a:fld>
             <a:endParaRPr lang="de-DE"/>
           </a:p>
@@ -2461,7 +2461,7 @@
           <a:p>
             <a:fld id="{A1724737-28FE-954F-810D-C447A43F99C3}" type="datetime1">
               <a:rPr lang="de-DE" smtClean="0"/>
-              <a:t>07.01.22</a:t>
+              <a:t>21.01.2022</a:t>
             </a:fld>
             <a:endParaRPr lang="de-DE"/>
           </a:p>
@@ -2503,7 +2503,7 @@
           <a:p>
             <a:fld id="{CFDF7393-88FB-5F49-BE96-ACDA21ADA254}" type="slidenum">
               <a:rPr lang="de-DE" smtClean="0"/>
-              <a:t>‹#›</a:t>
+              <a:t>‹Nr.›</a:t>
             </a:fld>
             <a:endParaRPr lang="de-DE"/>
           </a:p>
@@ -2738,7 +2738,7 @@
           <a:p>
             <a:fld id="{5904FCAA-6741-BF4E-9F9C-DFAE9F8FC207}" type="datetime1">
               <a:rPr lang="de-DE" smtClean="0"/>
-              <a:t>07.01.22</a:t>
+              <a:t>21.01.2022</a:t>
             </a:fld>
             <a:endParaRPr lang="de-DE"/>
           </a:p>
@@ -2780,7 +2780,7 @@
           <a:p>
             <a:fld id="{CFDF7393-88FB-5F49-BE96-ACDA21ADA254}" type="slidenum">
               <a:rPr lang="de-DE" smtClean="0"/>
-              <a:t>‹#›</a:t>
+              <a:t>‹Nr.›</a:t>
             </a:fld>
             <a:endParaRPr lang="de-DE"/>
           </a:p>
@@ -2995,7 +2995,7 @@
           <a:p>
             <a:fld id="{940FE327-1545-DF46-BE60-D76D5F93C476}" type="datetime1">
               <a:rPr lang="de-DE" smtClean="0"/>
-              <a:t>07.01.22</a:t>
+              <a:t>21.01.2022</a:t>
             </a:fld>
             <a:endParaRPr lang="de-DE"/>
           </a:p>
@@ -3037,7 +3037,7 @@
           <a:p>
             <a:fld id="{CFDF7393-88FB-5F49-BE96-ACDA21ADA254}" type="slidenum">
               <a:rPr lang="de-DE" smtClean="0"/>
-              <a:t>‹#›</a:t>
+              <a:t>‹Nr.›</a:t>
             </a:fld>
             <a:endParaRPr lang="de-DE"/>
           </a:p>
@@ -3208,7 +3208,7 @@
           <a:p>
             <a:fld id="{A34C2062-5105-C14A-BCAF-59119915036A}" type="datetime1">
               <a:rPr lang="de-DE" smtClean="0"/>
-              <a:t>07.01.22</a:t>
+              <a:t>21.01.2022</a:t>
             </a:fld>
             <a:endParaRPr lang="de-DE"/>
           </a:p>
@@ -3286,7 +3286,7 @@
           <a:p>
             <a:fld id="{CFDF7393-88FB-5F49-BE96-ACDA21ADA254}" type="slidenum">
               <a:rPr lang="de-DE" smtClean="0"/>
-              <a:t>‹#›</a:t>
+              <a:t>‹Nr.›</a:t>
             </a:fld>
             <a:endParaRPr lang="de-DE"/>
           </a:p>
@@ -3639,21 +3639,6 @@
               </a:rPr>
               <a:t>Software Engineering</a:t>
             </a:r>
-            <a:br>
-              <a:rPr lang="de-DE" dirty="0">
-                <a:solidFill>
-                  <a:srgbClr val="E0201C"/>
-                </a:solidFill>
-              </a:rPr>
-            </a:br>
-            <a:r>
-              <a:rPr lang="de-DE" dirty="0">
-                <a:solidFill>
-                  <a:srgbClr val="E0201C"/>
-                </a:solidFill>
-              </a:rPr>
-              <a:t>Übung</a:t>
-            </a:r>
           </a:p>
         </p:txBody>
       </p:sp>
@@ -3936,6 +3921,20 @@
               <a:t>IBM Watson zur Baumerkennung</a:t>
             </a:r>
           </a:p>
+          <a:p>
+            <a:pPr fontAlgn="ctr"/>
+            <a:r>
+              <a:rPr lang="de-DE" sz="2400" dirty="0"/>
+              <a:t>Plugin</a:t>
+            </a:r>
+          </a:p>
+          <a:p>
+            <a:pPr lvl="1" fontAlgn="ctr"/>
+            <a:r>
+              <a:rPr lang="de-DE" sz="2100" dirty="0"/>
+              <a:t>Kamera</a:t>
+            </a:r>
+          </a:p>
         </p:txBody>
       </p:sp>
       <p:sp>
@@ -4029,150 +4028,617 @@
             <a:off x="628649" y="1521354"/>
             <a:ext cx="3510731" cy="3626115"/>
           </a:xfrm>
+          <a:solidFill>
+            <a:schemeClr val="tx2">
+              <a:lumMod val="50000"/>
+            </a:schemeClr>
+          </a:solidFill>
+          <a:ln w="76200">
+            <a:solidFill>
+              <a:schemeClr val="accent5"/>
+            </a:solidFill>
+          </a:ln>
         </p:spPr>
         <p:txBody>
           <a:bodyPr>
-            <a:normAutofit/>
+            <a:normAutofit fontScale="70000" lnSpcReduction="20000"/>
           </a:bodyPr>
           <a:lstStyle/>
           <a:p>
-            <a:pPr marL="0" indent="0" fontAlgn="ctr">
+            <a:pPr marL="0" indent="0">
               <a:buNone/>
             </a:pPr>
-            <a:r>
-              <a:rPr lang="de-DE" sz="2400" dirty="0" err="1"/>
+            <a:endParaRPr lang="de-DE" sz="2000" b="0" dirty="0">
+              <a:solidFill>
+                <a:srgbClr val="FFB86C"/>
+              </a:solidFill>
+              <a:effectLst/>
+              <a:latin typeface="MesloLGM NF" panose="020B0609030804020204" pitchFamily="49" charset="0"/>
+            </a:endParaRPr>
+          </a:p>
+          <a:p>
+            <a:pPr marL="0" indent="0">
+              <a:buNone/>
+            </a:pPr>
+            <a:r>
+              <a:rPr lang="de-DE" sz="2000" b="0" dirty="0">
+                <a:solidFill>
+                  <a:srgbClr val="FFB86C"/>
+                </a:solidFill>
+                <a:effectLst/>
+                <a:latin typeface="MesloLGM NF" panose="020B0609030804020204" pitchFamily="49" charset="0"/>
+              </a:rPr>
               <a:t>interface</a:t>
             </a:r>
             <a:r>
-              <a:rPr lang="de-DE" sz="2400" dirty="0"/>
-              <a:t> Baum { </a:t>
-            </a:r>
-          </a:p>
-          <a:p>
-            <a:pPr marL="0" indent="0" fontAlgn="ctr">
+              <a:rPr lang="de-DE" sz="2000" b="0" dirty="0">
+                <a:solidFill>
+                  <a:srgbClr val="E6E6E6"/>
+                </a:solidFill>
+                <a:effectLst/>
+                <a:latin typeface="MesloLGM NF" panose="020B0609030804020204" pitchFamily="49" charset="0"/>
+              </a:rPr>
+              <a:t> </a:t>
+            </a:r>
+            <a:r>
+              <a:rPr lang="de-DE" sz="2000" b="0" dirty="0" err="1">
+                <a:solidFill>
+                  <a:srgbClr val="E6E6E6"/>
+                </a:solidFill>
+                <a:effectLst/>
+                <a:latin typeface="MesloLGM NF" panose="020B0609030804020204" pitchFamily="49" charset="0"/>
+              </a:rPr>
+              <a:t>GeoInfo</a:t>
+            </a:r>
+            <a:r>
+              <a:rPr lang="de-DE" sz="2000" b="0" dirty="0">
+                <a:solidFill>
+                  <a:srgbClr val="E6E6E6"/>
+                </a:solidFill>
+                <a:effectLst/>
+                <a:latin typeface="MesloLGM NF" panose="020B0609030804020204" pitchFamily="49" charset="0"/>
+              </a:rPr>
+              <a:t> {</a:t>
+            </a:r>
+          </a:p>
+          <a:p>
+            <a:pPr marL="0" indent="0">
               <a:buNone/>
             </a:pPr>
             <a:r>
-              <a:rPr lang="de-DE" sz="2400" dirty="0"/>
-              <a:t>	</a:t>
-            </a:r>
-            <a:r>
-              <a:rPr lang="de-DE" sz="2400" dirty="0" err="1"/>
-              <a:t>UserName</a:t>
-            </a:r>
-            <a:r>
-              <a:rPr lang="de-DE" sz="2400" dirty="0"/>
+              <a:rPr lang="de-DE" sz="2000" b="0" dirty="0">
+                <a:solidFill>
+                  <a:srgbClr val="E6E6E6"/>
+                </a:solidFill>
+                <a:effectLst/>
+                <a:latin typeface="MesloLGM NF" panose="020B0609030804020204" pitchFamily="49" charset="0"/>
+              </a:rPr>
+              <a:t>  </a:t>
+            </a:r>
+            <a:r>
+              <a:rPr lang="de-DE" sz="2000" b="0" dirty="0" err="1">
+                <a:solidFill>
+                  <a:srgbClr val="E6E6E6"/>
+                </a:solidFill>
+                <a:effectLst/>
+                <a:latin typeface="MesloLGM NF" panose="020B0609030804020204" pitchFamily="49" charset="0"/>
+              </a:rPr>
+              <a:t>address</a:t>
+            </a:r>
+            <a:r>
+              <a:rPr lang="de-DE" sz="2000" b="0" dirty="0">
+                <a:solidFill>
+                  <a:srgbClr val="E6E6E6"/>
+                </a:solidFill>
+                <a:effectLst/>
+                <a:latin typeface="MesloLGM NF" panose="020B0609030804020204" pitchFamily="49" charset="0"/>
+              </a:rPr>
               <a:t>: </a:t>
             </a:r>
             <a:r>
-              <a:rPr lang="de-DE" sz="2400" dirty="0" err="1"/>
+              <a:rPr lang="de-DE" sz="2000" b="0" dirty="0" err="1">
+                <a:solidFill>
+                  <a:srgbClr val="FFCC95"/>
+                </a:solidFill>
+                <a:effectLst/>
+                <a:latin typeface="MesloLGM NF" panose="020B0609030804020204" pitchFamily="49" charset="0"/>
+              </a:rPr>
               <a:t>string</a:t>
             </a:r>
             <a:r>
-              <a:rPr lang="de-DE" sz="2400" dirty="0"/>
+              <a:rPr lang="de-DE" sz="2000" b="0" dirty="0">
+                <a:solidFill>
+                  <a:srgbClr val="E6E6E6"/>
+                </a:solidFill>
+                <a:effectLst/>
+                <a:latin typeface="MesloLGM NF" panose="020B0609030804020204" pitchFamily="49" charset="0"/>
+              </a:rPr>
               <a:t>;</a:t>
             </a:r>
           </a:p>
           <a:p>
-            <a:pPr marL="0" indent="0" fontAlgn="ctr">
+            <a:pPr marL="0" indent="0">
               <a:buNone/>
             </a:pPr>
             <a:r>
-              <a:rPr lang="de-DE" sz="2400" dirty="0"/>
-              <a:t>	</a:t>
-            </a:r>
-            <a:r>
-              <a:rPr lang="de-DE" sz="2400" dirty="0" err="1"/>
-              <a:t>TreeName</a:t>
-            </a:r>
-            <a:r>
-              <a:rPr lang="de-DE" sz="2400" dirty="0"/>
+              <a:rPr lang="de-DE" sz="2000" b="0" dirty="0">
+                <a:solidFill>
+                  <a:srgbClr val="E6E6E6"/>
+                </a:solidFill>
+                <a:effectLst/>
+                <a:latin typeface="MesloLGM NF" panose="020B0609030804020204" pitchFamily="49" charset="0"/>
+              </a:rPr>
+              <a:t>  </a:t>
+            </a:r>
+            <a:r>
+              <a:rPr lang="de-DE" sz="2000" b="0" dirty="0" err="1">
+                <a:solidFill>
+                  <a:srgbClr val="E6E6E6"/>
+                </a:solidFill>
+                <a:effectLst/>
+                <a:latin typeface="MesloLGM NF" panose="020B0609030804020204" pitchFamily="49" charset="0"/>
+              </a:rPr>
+              <a:t>lat</a:t>
+            </a:r>
+            <a:r>
+              <a:rPr lang="de-DE" sz="2000" b="0" dirty="0">
+                <a:solidFill>
+                  <a:srgbClr val="E6E6E6"/>
+                </a:solidFill>
+                <a:effectLst/>
+                <a:latin typeface="MesloLGM NF" panose="020B0609030804020204" pitchFamily="49" charset="0"/>
+              </a:rPr>
               <a:t>: </a:t>
             </a:r>
             <a:r>
-              <a:rPr lang="de-DE" sz="2400" dirty="0" err="1"/>
+              <a:rPr lang="de-DE" sz="2000" b="0" dirty="0" err="1">
+                <a:solidFill>
+                  <a:srgbClr val="FFCC95"/>
+                </a:solidFill>
+                <a:effectLst/>
+                <a:latin typeface="MesloLGM NF" panose="020B0609030804020204" pitchFamily="49" charset="0"/>
+              </a:rPr>
+              <a:t>number</a:t>
+            </a:r>
+            <a:r>
+              <a:rPr lang="de-DE" sz="2000" b="0" dirty="0">
+                <a:solidFill>
+                  <a:srgbClr val="E6E6E6"/>
+                </a:solidFill>
+                <a:effectLst/>
+                <a:latin typeface="MesloLGM NF" panose="020B0609030804020204" pitchFamily="49" charset="0"/>
+              </a:rPr>
+              <a:t>;</a:t>
+            </a:r>
+          </a:p>
+          <a:p>
+            <a:pPr marL="0" indent="0">
+              <a:buNone/>
+            </a:pPr>
+            <a:r>
+              <a:rPr lang="de-DE" sz="2000" b="0" dirty="0">
+                <a:solidFill>
+                  <a:srgbClr val="E6E6E6"/>
+                </a:solidFill>
+                <a:effectLst/>
+                <a:latin typeface="MesloLGM NF" panose="020B0609030804020204" pitchFamily="49" charset="0"/>
+              </a:rPr>
+              <a:t>  </a:t>
+            </a:r>
+            <a:r>
+              <a:rPr lang="de-DE" sz="2000" b="0" dirty="0" err="1">
+                <a:solidFill>
+                  <a:srgbClr val="E6E6E6"/>
+                </a:solidFill>
+                <a:effectLst/>
+                <a:latin typeface="MesloLGM NF" panose="020B0609030804020204" pitchFamily="49" charset="0"/>
+              </a:rPr>
+              <a:t>lon</a:t>
+            </a:r>
+            <a:r>
+              <a:rPr lang="de-DE" sz="2000" b="0" dirty="0">
+                <a:solidFill>
+                  <a:srgbClr val="E6E6E6"/>
+                </a:solidFill>
+                <a:effectLst/>
+                <a:latin typeface="MesloLGM NF" panose="020B0609030804020204" pitchFamily="49" charset="0"/>
+              </a:rPr>
+              <a:t>: </a:t>
+            </a:r>
+            <a:r>
+              <a:rPr lang="de-DE" sz="2000" b="0" dirty="0" err="1">
+                <a:solidFill>
+                  <a:srgbClr val="FFCC95"/>
+                </a:solidFill>
+                <a:effectLst/>
+                <a:latin typeface="MesloLGM NF" panose="020B0609030804020204" pitchFamily="49" charset="0"/>
+              </a:rPr>
+              <a:t>number</a:t>
+            </a:r>
+            <a:r>
+              <a:rPr lang="de-DE" sz="2000" b="0" dirty="0">
+                <a:solidFill>
+                  <a:srgbClr val="E6E6E6"/>
+                </a:solidFill>
+                <a:effectLst/>
+                <a:latin typeface="MesloLGM NF" panose="020B0609030804020204" pitchFamily="49" charset="0"/>
+              </a:rPr>
+              <a:t>;</a:t>
+            </a:r>
+          </a:p>
+          <a:p>
+            <a:pPr marL="0" indent="0">
+              <a:buNone/>
+            </a:pPr>
+            <a:r>
+              <a:rPr lang="de-DE" sz="2000" b="0" dirty="0">
+                <a:solidFill>
+                  <a:srgbClr val="E6E6E6"/>
+                </a:solidFill>
+                <a:effectLst/>
+                <a:latin typeface="MesloLGM NF" panose="020B0609030804020204" pitchFamily="49" charset="0"/>
+              </a:rPr>
+              <a:t>}</a:t>
+            </a:r>
+          </a:p>
+          <a:p>
+            <a:pPr marL="0" indent="0">
+              <a:buNone/>
+            </a:pPr>
+            <a:endParaRPr lang="de-DE" sz="2000" b="0" dirty="0">
+              <a:solidFill>
+                <a:srgbClr val="E6E6E6"/>
+              </a:solidFill>
+              <a:effectLst/>
+              <a:latin typeface="MesloLGM NF" panose="020B0609030804020204" pitchFamily="49" charset="0"/>
+            </a:endParaRPr>
+          </a:p>
+          <a:p>
+            <a:pPr marL="0" indent="0">
+              <a:buNone/>
+            </a:pPr>
+            <a:r>
+              <a:rPr lang="de-DE" sz="2000" b="0" dirty="0">
+                <a:solidFill>
+                  <a:srgbClr val="FFB86C"/>
+                </a:solidFill>
+                <a:effectLst/>
+                <a:latin typeface="MesloLGM NF" panose="020B0609030804020204" pitchFamily="49" charset="0"/>
+              </a:rPr>
+              <a:t>interface</a:t>
+            </a:r>
+            <a:r>
+              <a:rPr lang="de-DE" sz="2000" b="0" dirty="0">
+                <a:solidFill>
+                  <a:srgbClr val="E6E6E6"/>
+                </a:solidFill>
+                <a:effectLst/>
+                <a:latin typeface="MesloLGM NF" panose="020B0609030804020204" pitchFamily="49" charset="0"/>
+              </a:rPr>
+              <a:t> </a:t>
+            </a:r>
+            <a:r>
+              <a:rPr lang="de-DE" sz="2000" b="0" dirty="0" err="1">
+                <a:solidFill>
+                  <a:srgbClr val="E6E6E6"/>
+                </a:solidFill>
+                <a:effectLst/>
+                <a:latin typeface="MesloLGM NF" panose="020B0609030804020204" pitchFamily="49" charset="0"/>
+              </a:rPr>
+              <a:t>Tree</a:t>
+            </a:r>
+            <a:r>
+              <a:rPr lang="de-DE" sz="2000" b="0" dirty="0">
+                <a:solidFill>
+                  <a:srgbClr val="E6E6E6"/>
+                </a:solidFill>
+                <a:effectLst/>
+                <a:latin typeface="MesloLGM NF" panose="020B0609030804020204" pitchFamily="49" charset="0"/>
+              </a:rPr>
+              <a:t> {</a:t>
+            </a:r>
+          </a:p>
+          <a:p>
+            <a:pPr marL="0" indent="0">
+              <a:buNone/>
+            </a:pPr>
+            <a:r>
+              <a:rPr lang="de-DE" sz="2000" b="0" dirty="0">
+                <a:solidFill>
+                  <a:srgbClr val="E6E6E6"/>
+                </a:solidFill>
+                <a:effectLst/>
+                <a:latin typeface="MesloLGM NF" panose="020B0609030804020204" pitchFamily="49" charset="0"/>
+              </a:rPr>
+              <a:t>  </a:t>
+            </a:r>
+            <a:r>
+              <a:rPr lang="de-DE" sz="2000" b="0" dirty="0" err="1">
+                <a:solidFill>
+                  <a:srgbClr val="E6E6E6"/>
+                </a:solidFill>
+                <a:effectLst/>
+                <a:latin typeface="MesloLGM NF" panose="020B0609030804020204" pitchFamily="49" charset="0"/>
+              </a:rPr>
+              <a:t>userName</a:t>
+            </a:r>
+            <a:r>
+              <a:rPr lang="de-DE" sz="2000" b="0" dirty="0">
+                <a:solidFill>
+                  <a:srgbClr val="E6E6E6"/>
+                </a:solidFill>
+                <a:effectLst/>
+                <a:latin typeface="MesloLGM NF" panose="020B0609030804020204" pitchFamily="49" charset="0"/>
+              </a:rPr>
+              <a:t>: </a:t>
+            </a:r>
+            <a:r>
+              <a:rPr lang="de-DE" sz="2000" b="0" dirty="0" err="1">
+                <a:solidFill>
+                  <a:srgbClr val="FFCC95"/>
+                </a:solidFill>
+                <a:effectLst/>
+                <a:latin typeface="MesloLGM NF" panose="020B0609030804020204" pitchFamily="49" charset="0"/>
+              </a:rPr>
               <a:t>string</a:t>
             </a:r>
             <a:r>
-              <a:rPr lang="de-DE" sz="2400" dirty="0"/>
+              <a:rPr lang="de-DE" sz="2000" b="0" dirty="0">
+                <a:solidFill>
+                  <a:srgbClr val="E6E6E6"/>
+                </a:solidFill>
+                <a:effectLst/>
+                <a:latin typeface="MesloLGM NF" panose="020B0609030804020204" pitchFamily="49" charset="0"/>
+              </a:rPr>
               <a:t>;</a:t>
             </a:r>
           </a:p>
           <a:p>
-            <a:pPr marL="0" indent="0" fontAlgn="ctr">
+            <a:pPr marL="0" indent="0">
               <a:buNone/>
             </a:pPr>
             <a:r>
-              <a:rPr lang="de-DE" sz="2400" dirty="0"/>
-              <a:t>	</a:t>
-            </a:r>
-            <a:r>
-              <a:rPr lang="de-DE" sz="2400" dirty="0" err="1"/>
-              <a:t>EloRating</a:t>
-            </a:r>
-            <a:r>
-              <a:rPr lang="de-DE" sz="2400" dirty="0"/>
+              <a:rPr lang="de-DE" sz="2000" b="0" dirty="0">
+                <a:solidFill>
+                  <a:srgbClr val="E6E6E6"/>
+                </a:solidFill>
+                <a:effectLst/>
+                <a:latin typeface="MesloLGM NF" panose="020B0609030804020204" pitchFamily="49" charset="0"/>
+              </a:rPr>
+              <a:t>  </a:t>
+            </a:r>
+            <a:r>
+              <a:rPr lang="de-DE" sz="2000" b="0" dirty="0" err="1">
+                <a:solidFill>
+                  <a:srgbClr val="E6E6E6"/>
+                </a:solidFill>
+                <a:effectLst/>
+                <a:latin typeface="MesloLGM NF" panose="020B0609030804020204" pitchFamily="49" charset="0"/>
+              </a:rPr>
+              <a:t>treeName</a:t>
+            </a:r>
+            <a:r>
+              <a:rPr lang="de-DE" sz="2000" b="0" dirty="0">
+                <a:solidFill>
+                  <a:srgbClr val="E6E6E6"/>
+                </a:solidFill>
+                <a:effectLst/>
+                <a:latin typeface="MesloLGM NF" panose="020B0609030804020204" pitchFamily="49" charset="0"/>
+              </a:rPr>
               <a:t>: </a:t>
             </a:r>
             <a:r>
-              <a:rPr lang="de-DE" sz="2400" dirty="0" err="1"/>
+              <a:rPr lang="de-DE" sz="2000" b="0" dirty="0" err="1">
+                <a:solidFill>
+                  <a:srgbClr val="FFCC95"/>
+                </a:solidFill>
+                <a:effectLst/>
+                <a:latin typeface="MesloLGM NF" panose="020B0609030804020204" pitchFamily="49" charset="0"/>
+              </a:rPr>
+              <a:t>string</a:t>
+            </a:r>
+            <a:r>
+              <a:rPr lang="de-DE" sz="2000" b="0" dirty="0">
+                <a:solidFill>
+                  <a:srgbClr val="E6E6E6"/>
+                </a:solidFill>
+                <a:effectLst/>
+                <a:latin typeface="MesloLGM NF" panose="020B0609030804020204" pitchFamily="49" charset="0"/>
+              </a:rPr>
+              <a:t>;</a:t>
+            </a:r>
+          </a:p>
+          <a:p>
+            <a:pPr marL="0" indent="0">
+              <a:buNone/>
+            </a:pPr>
+            <a:r>
+              <a:rPr lang="de-DE" sz="2000" b="0" dirty="0">
+                <a:solidFill>
+                  <a:srgbClr val="E6E6E6"/>
+                </a:solidFill>
+                <a:effectLst/>
+                <a:latin typeface="MesloLGM NF" panose="020B0609030804020204" pitchFamily="49" charset="0"/>
+              </a:rPr>
+              <a:t>  </a:t>
+            </a:r>
+            <a:r>
+              <a:rPr lang="de-DE" sz="2000" b="0" dirty="0" err="1">
+                <a:solidFill>
+                  <a:srgbClr val="E6E6E6"/>
+                </a:solidFill>
+                <a:effectLst/>
+                <a:latin typeface="MesloLGM NF" panose="020B0609030804020204" pitchFamily="49" charset="0"/>
+              </a:rPr>
+              <a:t>eloRating</a:t>
+            </a:r>
+            <a:r>
+              <a:rPr lang="de-DE" sz="2000" b="0" dirty="0">
+                <a:solidFill>
+                  <a:srgbClr val="E6E6E6"/>
+                </a:solidFill>
+                <a:effectLst/>
+                <a:latin typeface="MesloLGM NF" panose="020B0609030804020204" pitchFamily="49" charset="0"/>
+              </a:rPr>
+              <a:t>: </a:t>
+            </a:r>
+            <a:r>
+              <a:rPr lang="de-DE" sz="2000" b="0" dirty="0" err="1">
+                <a:solidFill>
+                  <a:srgbClr val="FFCC95"/>
+                </a:solidFill>
+                <a:effectLst/>
+                <a:latin typeface="MesloLGM NF" panose="020B0609030804020204" pitchFamily="49" charset="0"/>
+              </a:rPr>
               <a:t>number</a:t>
             </a:r>
             <a:r>
-              <a:rPr lang="de-DE" sz="2400" dirty="0"/>
+              <a:rPr lang="de-DE" sz="2000" b="0" dirty="0">
+                <a:solidFill>
+                  <a:srgbClr val="E6E6E6"/>
+                </a:solidFill>
+                <a:effectLst/>
+                <a:latin typeface="MesloLGM NF" panose="020B0609030804020204" pitchFamily="49" charset="0"/>
+              </a:rPr>
               <a:t>;</a:t>
             </a:r>
           </a:p>
           <a:p>
-            <a:pPr marL="0" indent="0" fontAlgn="ctr">
+            <a:pPr marL="0" indent="0">
               <a:buNone/>
             </a:pPr>
             <a:r>
-              <a:rPr lang="de-DE" sz="2400" dirty="0"/>
-              <a:t>	</a:t>
-            </a:r>
-            <a:r>
-              <a:rPr lang="de-DE" sz="2400" dirty="0" err="1"/>
+              <a:rPr lang="de-DE" sz="2000" b="0" dirty="0">
+                <a:solidFill>
+                  <a:srgbClr val="E6E6E6"/>
+                </a:solidFill>
+                <a:effectLst/>
+                <a:latin typeface="MesloLGM NF" panose="020B0609030804020204" pitchFamily="49" charset="0"/>
+              </a:rPr>
+              <a:t>  </a:t>
+            </a:r>
+            <a:r>
+              <a:rPr lang="de-DE" sz="2000" b="0" dirty="0" err="1">
+                <a:solidFill>
+                  <a:srgbClr val="E6E6E6"/>
+                </a:solidFill>
+                <a:effectLst/>
+                <a:latin typeface="MesloLGM NF" panose="020B0609030804020204" pitchFamily="49" charset="0"/>
+              </a:rPr>
+              <a:t>geoInfo</a:t>
+            </a:r>
+            <a:r>
+              <a:rPr lang="de-DE" sz="2000" b="0" dirty="0">
+                <a:solidFill>
+                  <a:srgbClr val="E6E6E6"/>
+                </a:solidFill>
+                <a:effectLst/>
+                <a:latin typeface="MesloLGM NF" panose="020B0609030804020204" pitchFamily="49" charset="0"/>
+              </a:rPr>
+              <a:t>: </a:t>
+            </a:r>
+            <a:r>
+              <a:rPr lang="de-DE" sz="2000" b="0" dirty="0" err="1">
+                <a:solidFill>
+                  <a:srgbClr val="E6E6E6"/>
+                </a:solidFill>
+                <a:effectLst/>
+                <a:latin typeface="MesloLGM NF" panose="020B0609030804020204" pitchFamily="49" charset="0"/>
+              </a:rPr>
               <a:t>GeoInfo</a:t>
             </a:r>
             <a:r>
-              <a:rPr lang="de-DE" sz="2400" dirty="0"/>
+              <a:rPr lang="de-DE" sz="2000" b="0" dirty="0">
+                <a:solidFill>
+                  <a:srgbClr val="E6E6E6"/>
+                </a:solidFill>
+                <a:effectLst/>
+                <a:latin typeface="MesloLGM NF" panose="020B0609030804020204" pitchFamily="49" charset="0"/>
+              </a:rPr>
+              <a:t>;</a:t>
+            </a:r>
+          </a:p>
+          <a:p>
+            <a:pPr marL="0" indent="0">
+              <a:buNone/>
+            </a:pPr>
+            <a:r>
+              <a:rPr lang="de-DE" sz="2000" b="0" dirty="0">
+                <a:solidFill>
+                  <a:srgbClr val="E6E6E6"/>
+                </a:solidFill>
+                <a:effectLst/>
+                <a:latin typeface="MesloLGM NF" panose="020B0609030804020204" pitchFamily="49" charset="0"/>
+              </a:rPr>
+              <a:t>  </a:t>
+            </a:r>
+            <a:r>
+              <a:rPr lang="de-DE" sz="2000" b="0" dirty="0" err="1">
+                <a:solidFill>
+                  <a:srgbClr val="E6E6E6"/>
+                </a:solidFill>
+                <a:effectLst/>
+                <a:latin typeface="MesloLGM NF" panose="020B0609030804020204" pitchFamily="49" charset="0"/>
+              </a:rPr>
+              <a:t>image</a:t>
+            </a:r>
+            <a:r>
+              <a:rPr lang="de-DE" sz="2000" b="0" dirty="0">
+                <a:solidFill>
+                  <a:srgbClr val="E6E6E6"/>
+                </a:solidFill>
+                <a:effectLst/>
+                <a:latin typeface="MesloLGM NF" panose="020B0609030804020204" pitchFamily="49" charset="0"/>
+              </a:rPr>
               <a:t>: </a:t>
             </a:r>
             <a:r>
-              <a:rPr lang="de-DE" sz="2400" dirty="0" err="1"/>
-              <a:t>GeoInfo</a:t>
-            </a:r>
-            <a:r>
-              <a:rPr lang="de-DE" sz="2400" dirty="0"/>
+              <a:rPr lang="de-DE" sz="2000" b="0" dirty="0" err="1">
+                <a:solidFill>
+                  <a:srgbClr val="FFCC95"/>
+                </a:solidFill>
+                <a:effectLst/>
+                <a:latin typeface="MesloLGM NF" panose="020B0609030804020204" pitchFamily="49" charset="0"/>
+              </a:rPr>
+              <a:t>string</a:t>
+            </a:r>
+            <a:r>
+              <a:rPr lang="de-DE" sz="2000" b="0" dirty="0">
+                <a:solidFill>
+                  <a:srgbClr val="E6E6E6"/>
+                </a:solidFill>
+                <a:effectLst/>
+                <a:latin typeface="MesloLGM NF" panose="020B0609030804020204" pitchFamily="49" charset="0"/>
+              </a:rPr>
               <a:t>;</a:t>
             </a:r>
           </a:p>
           <a:p>
-            <a:pPr marL="0" indent="0" fontAlgn="ctr">
+            <a:pPr marL="0" indent="0">
               <a:buNone/>
             </a:pPr>
             <a:r>
-              <a:rPr lang="de-DE" sz="2400" dirty="0"/>
-              <a:t>	Image: </a:t>
-            </a:r>
-            <a:r>
-              <a:rPr lang="de-DE" sz="2400" dirty="0" err="1"/>
-              <a:t>string</a:t>
-            </a:r>
-            <a:r>
-              <a:rPr lang="de-DE" sz="2400" dirty="0"/>
-              <a:t>;</a:t>
-            </a:r>
-          </a:p>
-          <a:p>
-            <a:pPr marL="0" indent="0" fontAlgn="ctr">
+              <a:rPr lang="de-DE" sz="2000" b="0" dirty="0">
+                <a:solidFill>
+                  <a:srgbClr val="E6E6E6"/>
+                </a:solidFill>
+                <a:effectLst/>
+                <a:latin typeface="MesloLGM NF" panose="020B0609030804020204" pitchFamily="49" charset="0"/>
+              </a:rPr>
+              <a:t>}</a:t>
+            </a:r>
+          </a:p>
+          <a:p>
+            <a:pPr marL="0" indent="0">
               <a:buNone/>
             </a:pPr>
-            <a:r>
-              <a:rPr lang="de-DE" sz="2400" dirty="0"/>
-              <a:t>}</a:t>
-            </a:r>
+            <a:endParaRPr lang="de-DE" sz="2000" b="0" dirty="0">
+              <a:solidFill>
+                <a:srgbClr val="E6E6E6"/>
+              </a:solidFill>
+              <a:effectLst/>
+              <a:latin typeface="MesloLGM NF" panose="020B0609030804020204" pitchFamily="49" charset="0"/>
+            </a:endParaRPr>
           </a:p>
           <a:p>
             <a:pPr marL="0" indent="0" fontAlgn="ctr">
@@ -4203,585 +4669,6 @@
               <a:t>4</a:t>
             </a:fld>
             <a:endParaRPr lang="de-DE"/>
-          </a:p>
-        </p:txBody>
-      </p:sp>
-      <p:sp>
-        <p:nvSpPr>
-          <p:cNvPr id="7" name="Inhaltsplatzhalter 2">
-            <a:extLst>
-              <a:ext uri="{FF2B5EF4-FFF2-40B4-BE49-F238E27FC236}">
-                <a16:creationId xmlns:a16="http://schemas.microsoft.com/office/drawing/2014/main" id="{85D00F1D-05A2-FA42-896D-B466E07F6D5E}"/>
-              </a:ext>
-            </a:extLst>
-          </p:cNvPr>
-          <p:cNvSpPr txBox="1">
-            <a:spLocks/>
-          </p:cNvSpPr>
-          <p:nvPr/>
-        </p:nvSpPr>
-        <p:spPr>
-          <a:xfrm>
-            <a:off x="4389488" y="1496774"/>
-            <a:ext cx="4135079" cy="1728208"/>
-          </a:xfrm>
-          <a:prstGeom prst="rect">
-            <a:avLst/>
-          </a:prstGeom>
-        </p:spPr>
-        <p:txBody>
-          <a:bodyPr vert="horz" lIns="91440" tIns="45720" rIns="91440" bIns="45720" rtlCol="0">
-            <a:normAutofit/>
-          </a:bodyPr>
-          <a:lstStyle>
-            <a:lvl1pPr marL="171450" indent="-171450" algn="l" defTabSz="685800" rtl="0" eaLnBrk="1" latinLnBrk="0" hangingPunct="1">
-              <a:lnSpc>
-                <a:spcPct val="90000"/>
-              </a:lnSpc>
-              <a:spcBef>
-                <a:spcPts val="750"/>
-              </a:spcBef>
-              <a:buClr>
-                <a:srgbClr val="E0201C"/>
-              </a:buClr>
-              <a:buFont typeface="Wingdings" charset="2"/>
-              <a:buChar char="§"/>
-              <a:defRPr sz="2100" kern="1200">
-                <a:solidFill>
-                  <a:srgbClr val="5C6971"/>
-                </a:solidFill>
-                <a:latin typeface="+mn-lt"/>
-                <a:ea typeface="+mn-ea"/>
-                <a:cs typeface="+mn-cs"/>
-              </a:defRPr>
-            </a:lvl1pPr>
-            <a:lvl2pPr marL="514350" indent="-171450" algn="l" defTabSz="685800" rtl="0" eaLnBrk="1" latinLnBrk="0" hangingPunct="1">
-              <a:lnSpc>
-                <a:spcPct val="90000"/>
-              </a:lnSpc>
-              <a:spcBef>
-                <a:spcPts val="375"/>
-              </a:spcBef>
-              <a:buClr>
-                <a:srgbClr val="5C6971"/>
-              </a:buClr>
-              <a:buFont typeface="Wingdings" charset="2"/>
-              <a:buChar char="§"/>
-              <a:defRPr sz="1800" kern="1200">
-                <a:solidFill>
-                  <a:srgbClr val="5C6971"/>
-                </a:solidFill>
-                <a:latin typeface="+mn-lt"/>
-                <a:ea typeface="+mn-ea"/>
-                <a:cs typeface="+mn-cs"/>
-              </a:defRPr>
-            </a:lvl2pPr>
-            <a:lvl3pPr marL="857250" indent="-171450" algn="l" defTabSz="685800" rtl="0" eaLnBrk="1" latinLnBrk="0" hangingPunct="1">
-              <a:lnSpc>
-                <a:spcPct val="90000"/>
-              </a:lnSpc>
-              <a:spcBef>
-                <a:spcPts val="375"/>
-              </a:spcBef>
-              <a:buClr>
-                <a:srgbClr val="5C6971"/>
-              </a:buClr>
-              <a:buFont typeface="Wingdings" charset="2"/>
-              <a:buChar char="§"/>
-              <a:defRPr sz="1500" kern="1200">
-                <a:solidFill>
-                  <a:schemeClr val="tx1"/>
-                </a:solidFill>
-                <a:latin typeface="+mn-lt"/>
-                <a:ea typeface="+mn-ea"/>
-                <a:cs typeface="+mn-cs"/>
-              </a:defRPr>
-            </a:lvl3pPr>
-            <a:lvl4pPr marL="1200150" indent="-171450" algn="l" defTabSz="685800" rtl="0" eaLnBrk="1" latinLnBrk="0" hangingPunct="1">
-              <a:lnSpc>
-                <a:spcPct val="90000"/>
-              </a:lnSpc>
-              <a:spcBef>
-                <a:spcPts val="375"/>
-              </a:spcBef>
-              <a:buClr>
-                <a:srgbClr val="5C6971"/>
-              </a:buClr>
-              <a:buFont typeface="Wingdings" charset="2"/>
-              <a:buChar char="§"/>
-              <a:defRPr sz="1350" kern="1200">
-                <a:solidFill>
-                  <a:schemeClr val="tx1"/>
-                </a:solidFill>
-                <a:latin typeface="+mn-lt"/>
-                <a:ea typeface="+mn-ea"/>
-                <a:cs typeface="+mn-cs"/>
-              </a:defRPr>
-            </a:lvl4pPr>
-            <a:lvl5pPr marL="1543050" indent="-171450" algn="l" defTabSz="685800" rtl="0" eaLnBrk="1" latinLnBrk="0" hangingPunct="1">
-              <a:lnSpc>
-                <a:spcPct val="90000"/>
-              </a:lnSpc>
-              <a:spcBef>
-                <a:spcPts val="375"/>
-              </a:spcBef>
-              <a:buClr>
-                <a:srgbClr val="5C6971"/>
-              </a:buClr>
-              <a:buFont typeface="Wingdings" charset="2"/>
-              <a:buChar char="§"/>
-              <a:defRPr sz="1350" kern="1200">
-                <a:solidFill>
-                  <a:schemeClr val="tx1"/>
-                </a:solidFill>
-                <a:latin typeface="+mn-lt"/>
-                <a:ea typeface="+mn-ea"/>
-                <a:cs typeface="+mn-cs"/>
-              </a:defRPr>
-            </a:lvl5pPr>
-            <a:lvl6pPr marL="1885950" indent="-171450" algn="l" defTabSz="685800" rtl="0" eaLnBrk="1" latinLnBrk="0" hangingPunct="1">
-              <a:lnSpc>
-                <a:spcPct val="90000"/>
-              </a:lnSpc>
-              <a:spcBef>
-                <a:spcPts val="375"/>
-              </a:spcBef>
-              <a:buFont typeface="Arial" panose="020B0604020202020204" pitchFamily="34" charset="0"/>
-              <a:buChar char="•"/>
-              <a:defRPr sz="1350" kern="1200">
-                <a:solidFill>
-                  <a:schemeClr val="tx1"/>
-                </a:solidFill>
-                <a:latin typeface="+mn-lt"/>
-                <a:ea typeface="+mn-ea"/>
-                <a:cs typeface="+mn-cs"/>
-              </a:defRPr>
-            </a:lvl6pPr>
-            <a:lvl7pPr marL="2228850" indent="-171450" algn="l" defTabSz="685800" rtl="0" eaLnBrk="1" latinLnBrk="0" hangingPunct="1">
-              <a:lnSpc>
-                <a:spcPct val="90000"/>
-              </a:lnSpc>
-              <a:spcBef>
-                <a:spcPts val="375"/>
-              </a:spcBef>
-              <a:buFont typeface="Arial" panose="020B0604020202020204" pitchFamily="34" charset="0"/>
-              <a:buChar char="•"/>
-              <a:defRPr sz="1350" kern="1200">
-                <a:solidFill>
-                  <a:schemeClr val="tx1"/>
-                </a:solidFill>
-                <a:latin typeface="+mn-lt"/>
-                <a:ea typeface="+mn-ea"/>
-                <a:cs typeface="+mn-cs"/>
-              </a:defRPr>
-            </a:lvl7pPr>
-            <a:lvl8pPr marL="2571750" indent="-171450" algn="l" defTabSz="685800" rtl="0" eaLnBrk="1" latinLnBrk="0" hangingPunct="1">
-              <a:lnSpc>
-                <a:spcPct val="90000"/>
-              </a:lnSpc>
-              <a:spcBef>
-                <a:spcPts val="375"/>
-              </a:spcBef>
-              <a:buFont typeface="Arial" panose="020B0604020202020204" pitchFamily="34" charset="0"/>
-              <a:buChar char="•"/>
-              <a:defRPr sz="1350" kern="1200">
-                <a:solidFill>
-                  <a:schemeClr val="tx1"/>
-                </a:solidFill>
-                <a:latin typeface="+mn-lt"/>
-                <a:ea typeface="+mn-ea"/>
-                <a:cs typeface="+mn-cs"/>
-              </a:defRPr>
-            </a:lvl8pPr>
-            <a:lvl9pPr marL="2914650" indent="-171450" algn="l" defTabSz="685800" rtl="0" eaLnBrk="1" latinLnBrk="0" hangingPunct="1">
-              <a:lnSpc>
-                <a:spcPct val="90000"/>
-              </a:lnSpc>
-              <a:spcBef>
-                <a:spcPts val="375"/>
-              </a:spcBef>
-              <a:buFont typeface="Arial" panose="020B0604020202020204" pitchFamily="34" charset="0"/>
-              <a:buChar char="•"/>
-              <a:defRPr sz="1350" kern="1200">
-                <a:solidFill>
-                  <a:schemeClr val="tx1"/>
-                </a:solidFill>
-                <a:latin typeface="+mn-lt"/>
-                <a:ea typeface="+mn-ea"/>
-                <a:cs typeface="+mn-cs"/>
-              </a:defRPr>
-            </a:lvl9pPr>
-          </a:lstStyle>
-          <a:p>
-            <a:pPr marL="0" indent="0" fontAlgn="ctr">
-              <a:buFont typeface="Wingdings" charset="2"/>
-              <a:buNone/>
-            </a:pPr>
-            <a:r>
-              <a:rPr lang="de-DE" sz="2400" dirty="0" err="1"/>
-              <a:t>interface</a:t>
-            </a:r>
-            <a:r>
-              <a:rPr lang="de-DE" sz="2400" dirty="0"/>
-              <a:t> User { </a:t>
-            </a:r>
-          </a:p>
-          <a:p>
-            <a:pPr marL="0" indent="0" fontAlgn="ctr">
-              <a:buFont typeface="Wingdings" charset="2"/>
-              <a:buNone/>
-            </a:pPr>
-            <a:r>
-              <a:rPr lang="de-DE" sz="2400" dirty="0"/>
-              <a:t>	Name: </a:t>
-            </a:r>
-            <a:r>
-              <a:rPr lang="de-DE" sz="2400" dirty="0" err="1"/>
-              <a:t>string</a:t>
-            </a:r>
-            <a:r>
-              <a:rPr lang="de-DE" sz="2400" dirty="0"/>
-              <a:t>;</a:t>
-            </a:r>
-          </a:p>
-          <a:p>
-            <a:pPr marL="0" indent="0" fontAlgn="ctr">
-              <a:buFont typeface="Wingdings" charset="2"/>
-              <a:buNone/>
-            </a:pPr>
-            <a:r>
-              <a:rPr lang="de-DE" sz="2400" dirty="0"/>
-              <a:t>	</a:t>
-            </a:r>
-            <a:r>
-              <a:rPr lang="de-DE" sz="2400" dirty="0" err="1"/>
-              <a:t>DateAdded</a:t>
-            </a:r>
-            <a:r>
-              <a:rPr lang="de-DE" sz="2400" dirty="0"/>
-              <a:t>: </a:t>
-            </a:r>
-            <a:r>
-              <a:rPr lang="de-DE" sz="2400" dirty="0" err="1"/>
-              <a:t>DateTime</a:t>
-            </a:r>
-            <a:endParaRPr lang="de-DE" sz="2400" dirty="0"/>
-          </a:p>
-          <a:p>
-            <a:pPr marL="0" indent="0" fontAlgn="ctr">
-              <a:buFont typeface="Wingdings" charset="2"/>
-              <a:buNone/>
-            </a:pPr>
-            <a:r>
-              <a:rPr lang="de-DE" sz="2400" dirty="0"/>
-              <a:t>}</a:t>
-            </a:r>
-          </a:p>
-          <a:p>
-            <a:pPr marL="0" indent="0" fontAlgn="ctr">
-              <a:buFont typeface="Wingdings" charset="2"/>
-              <a:buNone/>
-            </a:pPr>
-            <a:endParaRPr lang="de-DE" sz="2400" dirty="0"/>
-          </a:p>
-        </p:txBody>
-      </p:sp>
-      <p:sp>
-        <p:nvSpPr>
-          <p:cNvPr id="8" name="Inhaltsplatzhalter 2">
-            <a:extLst>
-              <a:ext uri="{FF2B5EF4-FFF2-40B4-BE49-F238E27FC236}">
-                <a16:creationId xmlns:a16="http://schemas.microsoft.com/office/drawing/2014/main" id="{2F0B2174-8EC9-A34A-A312-C3EF59D50041}"/>
-              </a:ext>
-            </a:extLst>
-          </p:cNvPr>
-          <p:cNvSpPr txBox="1">
-            <a:spLocks/>
-          </p:cNvSpPr>
-          <p:nvPr/>
-        </p:nvSpPr>
-        <p:spPr>
-          <a:xfrm>
-            <a:off x="4389488" y="3256748"/>
-            <a:ext cx="4135079" cy="3626115"/>
-          </a:xfrm>
-          <a:prstGeom prst="rect">
-            <a:avLst/>
-          </a:prstGeom>
-        </p:spPr>
-        <p:txBody>
-          <a:bodyPr vert="horz" lIns="91440" tIns="45720" rIns="91440" bIns="45720" rtlCol="0">
-            <a:normAutofit/>
-          </a:bodyPr>
-          <a:lstStyle>
-            <a:lvl1pPr marL="171450" indent="-171450" algn="l" defTabSz="685800" rtl="0" eaLnBrk="1" latinLnBrk="0" hangingPunct="1">
-              <a:lnSpc>
-                <a:spcPct val="90000"/>
-              </a:lnSpc>
-              <a:spcBef>
-                <a:spcPts val="750"/>
-              </a:spcBef>
-              <a:buClr>
-                <a:srgbClr val="E0201C"/>
-              </a:buClr>
-              <a:buFont typeface="Wingdings" charset="2"/>
-              <a:buChar char="§"/>
-              <a:defRPr sz="2100" kern="1200">
-                <a:solidFill>
-                  <a:srgbClr val="5C6971"/>
-                </a:solidFill>
-                <a:latin typeface="+mn-lt"/>
-                <a:ea typeface="+mn-ea"/>
-                <a:cs typeface="+mn-cs"/>
-              </a:defRPr>
-            </a:lvl1pPr>
-            <a:lvl2pPr marL="514350" indent="-171450" algn="l" defTabSz="685800" rtl="0" eaLnBrk="1" latinLnBrk="0" hangingPunct="1">
-              <a:lnSpc>
-                <a:spcPct val="90000"/>
-              </a:lnSpc>
-              <a:spcBef>
-                <a:spcPts val="375"/>
-              </a:spcBef>
-              <a:buClr>
-                <a:srgbClr val="5C6971"/>
-              </a:buClr>
-              <a:buFont typeface="Wingdings" charset="2"/>
-              <a:buChar char="§"/>
-              <a:defRPr sz="1800" kern="1200">
-                <a:solidFill>
-                  <a:srgbClr val="5C6971"/>
-                </a:solidFill>
-                <a:latin typeface="+mn-lt"/>
-                <a:ea typeface="+mn-ea"/>
-                <a:cs typeface="+mn-cs"/>
-              </a:defRPr>
-            </a:lvl2pPr>
-            <a:lvl3pPr marL="857250" indent="-171450" algn="l" defTabSz="685800" rtl="0" eaLnBrk="1" latinLnBrk="0" hangingPunct="1">
-              <a:lnSpc>
-                <a:spcPct val="90000"/>
-              </a:lnSpc>
-              <a:spcBef>
-                <a:spcPts val="375"/>
-              </a:spcBef>
-              <a:buClr>
-                <a:srgbClr val="5C6971"/>
-              </a:buClr>
-              <a:buFont typeface="Wingdings" charset="2"/>
-              <a:buChar char="§"/>
-              <a:defRPr sz="1500" kern="1200">
-                <a:solidFill>
-                  <a:schemeClr val="tx1"/>
-                </a:solidFill>
-                <a:latin typeface="+mn-lt"/>
-                <a:ea typeface="+mn-ea"/>
-                <a:cs typeface="+mn-cs"/>
-              </a:defRPr>
-            </a:lvl3pPr>
-            <a:lvl4pPr marL="1200150" indent="-171450" algn="l" defTabSz="685800" rtl="0" eaLnBrk="1" latinLnBrk="0" hangingPunct="1">
-              <a:lnSpc>
-                <a:spcPct val="90000"/>
-              </a:lnSpc>
-              <a:spcBef>
-                <a:spcPts val="375"/>
-              </a:spcBef>
-              <a:buClr>
-                <a:srgbClr val="5C6971"/>
-              </a:buClr>
-              <a:buFont typeface="Wingdings" charset="2"/>
-              <a:buChar char="§"/>
-              <a:defRPr sz="1350" kern="1200">
-                <a:solidFill>
-                  <a:schemeClr val="tx1"/>
-                </a:solidFill>
-                <a:latin typeface="+mn-lt"/>
-                <a:ea typeface="+mn-ea"/>
-                <a:cs typeface="+mn-cs"/>
-              </a:defRPr>
-            </a:lvl4pPr>
-            <a:lvl5pPr marL="1543050" indent="-171450" algn="l" defTabSz="685800" rtl="0" eaLnBrk="1" latinLnBrk="0" hangingPunct="1">
-              <a:lnSpc>
-                <a:spcPct val="90000"/>
-              </a:lnSpc>
-              <a:spcBef>
-                <a:spcPts val="375"/>
-              </a:spcBef>
-              <a:buClr>
-                <a:srgbClr val="5C6971"/>
-              </a:buClr>
-              <a:buFont typeface="Wingdings" charset="2"/>
-              <a:buChar char="§"/>
-              <a:defRPr sz="1350" kern="1200">
-                <a:solidFill>
-                  <a:schemeClr val="tx1"/>
-                </a:solidFill>
-                <a:latin typeface="+mn-lt"/>
-                <a:ea typeface="+mn-ea"/>
-                <a:cs typeface="+mn-cs"/>
-              </a:defRPr>
-            </a:lvl5pPr>
-            <a:lvl6pPr marL="1885950" indent="-171450" algn="l" defTabSz="685800" rtl="0" eaLnBrk="1" latinLnBrk="0" hangingPunct="1">
-              <a:lnSpc>
-                <a:spcPct val="90000"/>
-              </a:lnSpc>
-              <a:spcBef>
-                <a:spcPts val="375"/>
-              </a:spcBef>
-              <a:buFont typeface="Arial" panose="020B0604020202020204" pitchFamily="34" charset="0"/>
-              <a:buChar char="•"/>
-              <a:defRPr sz="1350" kern="1200">
-                <a:solidFill>
-                  <a:schemeClr val="tx1"/>
-                </a:solidFill>
-                <a:latin typeface="+mn-lt"/>
-                <a:ea typeface="+mn-ea"/>
-                <a:cs typeface="+mn-cs"/>
-              </a:defRPr>
-            </a:lvl6pPr>
-            <a:lvl7pPr marL="2228850" indent="-171450" algn="l" defTabSz="685800" rtl="0" eaLnBrk="1" latinLnBrk="0" hangingPunct="1">
-              <a:lnSpc>
-                <a:spcPct val="90000"/>
-              </a:lnSpc>
-              <a:spcBef>
-                <a:spcPts val="375"/>
-              </a:spcBef>
-              <a:buFont typeface="Arial" panose="020B0604020202020204" pitchFamily="34" charset="0"/>
-              <a:buChar char="•"/>
-              <a:defRPr sz="1350" kern="1200">
-                <a:solidFill>
-                  <a:schemeClr val="tx1"/>
-                </a:solidFill>
-                <a:latin typeface="+mn-lt"/>
-                <a:ea typeface="+mn-ea"/>
-                <a:cs typeface="+mn-cs"/>
-              </a:defRPr>
-            </a:lvl7pPr>
-            <a:lvl8pPr marL="2571750" indent="-171450" algn="l" defTabSz="685800" rtl="0" eaLnBrk="1" latinLnBrk="0" hangingPunct="1">
-              <a:lnSpc>
-                <a:spcPct val="90000"/>
-              </a:lnSpc>
-              <a:spcBef>
-                <a:spcPts val="375"/>
-              </a:spcBef>
-              <a:buFont typeface="Arial" panose="020B0604020202020204" pitchFamily="34" charset="0"/>
-              <a:buChar char="•"/>
-              <a:defRPr sz="1350" kern="1200">
-                <a:solidFill>
-                  <a:schemeClr val="tx1"/>
-                </a:solidFill>
-                <a:latin typeface="+mn-lt"/>
-                <a:ea typeface="+mn-ea"/>
-                <a:cs typeface="+mn-cs"/>
-              </a:defRPr>
-            </a:lvl8pPr>
-            <a:lvl9pPr marL="2914650" indent="-171450" algn="l" defTabSz="685800" rtl="0" eaLnBrk="1" latinLnBrk="0" hangingPunct="1">
-              <a:lnSpc>
-                <a:spcPct val="90000"/>
-              </a:lnSpc>
-              <a:spcBef>
-                <a:spcPts val="375"/>
-              </a:spcBef>
-              <a:buFont typeface="Arial" panose="020B0604020202020204" pitchFamily="34" charset="0"/>
-              <a:buChar char="•"/>
-              <a:defRPr sz="1350" kern="1200">
-                <a:solidFill>
-                  <a:schemeClr val="tx1"/>
-                </a:solidFill>
-                <a:latin typeface="+mn-lt"/>
-                <a:ea typeface="+mn-ea"/>
-                <a:cs typeface="+mn-cs"/>
-              </a:defRPr>
-            </a:lvl9pPr>
-          </a:lstStyle>
-          <a:p>
-            <a:pPr marL="0" indent="0" fontAlgn="ctr">
-              <a:buFont typeface="Wingdings" charset="2"/>
-              <a:buNone/>
-            </a:pPr>
-            <a:r>
-              <a:rPr lang="de-DE" sz="2400" dirty="0" err="1"/>
-              <a:t>interface</a:t>
-            </a:r>
-            <a:r>
-              <a:rPr lang="de-DE" sz="2400" dirty="0"/>
-              <a:t> </a:t>
-            </a:r>
-            <a:r>
-              <a:rPr lang="de-DE" sz="2400" dirty="0" err="1"/>
-              <a:t>GeoInfo</a:t>
-            </a:r>
-            <a:r>
-              <a:rPr lang="de-DE" sz="2400" dirty="0"/>
-              <a:t> { </a:t>
-            </a:r>
-          </a:p>
-          <a:p>
-            <a:pPr marL="0" indent="0" fontAlgn="ctr">
-              <a:buFont typeface="Wingdings" charset="2"/>
-              <a:buNone/>
-            </a:pPr>
-            <a:r>
-              <a:rPr lang="de-DE" sz="2400" dirty="0"/>
-              <a:t>	</a:t>
-            </a:r>
-            <a:r>
-              <a:rPr lang="de-DE" sz="2400" dirty="0" err="1"/>
-              <a:t>Address</a:t>
-            </a:r>
-            <a:r>
-              <a:rPr lang="de-DE" sz="2400" dirty="0"/>
-              <a:t>: </a:t>
-            </a:r>
-            <a:r>
-              <a:rPr lang="de-DE" sz="2400" dirty="0" err="1"/>
-              <a:t>string</a:t>
-            </a:r>
-            <a:r>
-              <a:rPr lang="de-DE" sz="2400" dirty="0"/>
-              <a:t>;</a:t>
-            </a:r>
-          </a:p>
-          <a:p>
-            <a:pPr marL="0" indent="0" fontAlgn="ctr">
-              <a:buFont typeface="Wingdings" charset="2"/>
-              <a:buNone/>
-            </a:pPr>
-            <a:r>
-              <a:rPr lang="de-DE" sz="2400" dirty="0"/>
-              <a:t>	</a:t>
-            </a:r>
-            <a:r>
-              <a:rPr lang="de-DE" sz="2400" dirty="0" err="1"/>
-              <a:t>Coordinates</a:t>
-            </a:r>
-            <a:r>
-              <a:rPr lang="de-DE" sz="2400" dirty="0"/>
-              <a:t>: </a:t>
-            </a:r>
-            <a:r>
-              <a:rPr lang="de-DE" sz="2400" dirty="0" err="1"/>
-              <a:t>number</a:t>
-            </a:r>
-            <a:r>
-              <a:rPr lang="de-DE" sz="2400" dirty="0"/>
-              <a:t>;</a:t>
-            </a:r>
-          </a:p>
-          <a:p>
-            <a:pPr marL="0" indent="0" fontAlgn="ctr">
-              <a:buFont typeface="Wingdings" charset="2"/>
-              <a:buNone/>
-            </a:pPr>
-            <a:r>
-              <a:rPr lang="de-DE" sz="2400" dirty="0"/>
-              <a:t>}</a:t>
-            </a:r>
-          </a:p>
-          <a:p>
-            <a:pPr marL="0" indent="0" fontAlgn="ctr">
-              <a:buFont typeface="Wingdings" charset="2"/>
-              <a:buNone/>
-            </a:pPr>
-            <a:endParaRPr lang="de-DE" sz="2400" dirty="0"/>
           </a:p>
         </p:txBody>
       </p:sp>

</xml_diff>